<commit_message>
Added System Tests for DoseResponseResults
</commit_message>
<xml_diff>
--- a/docs/Presentations/WestEastMilestone2Presentation_v1.pptx
+++ b/docs/Presentations/WestEastMilestone2Presentation_v1.pptx
@@ -486,11 +486,11 @@
           <c:showPercent val="0"/>
           <c:showBubbleSize val="0"/>
         </c:dLbls>
-        <c:axId val="-2125553368"/>
-        <c:axId val="-2125889912"/>
+        <c:axId val="-2135739080"/>
+        <c:axId val="2115892392"/>
       </c:scatterChart>
       <c:valAx>
-        <c:axId val="-2125553368"/>
+        <c:axId val="-2135739080"/>
         <c:scaling>
           <c:orientation val="minMax"/>
           <c:max val="10.0"/>
@@ -521,12 +521,12 @@
         <c:majorTickMark val="out"/>
         <c:minorTickMark val="none"/>
         <c:tickLblPos val="nextTo"/>
-        <c:crossAx val="-2125889912"/>
+        <c:crossAx val="2115892392"/>
         <c:crosses val="autoZero"/>
         <c:crossBetween val="midCat"/>
       </c:valAx>
       <c:valAx>
-        <c:axId val="-2125889912"/>
+        <c:axId val="2115892392"/>
         <c:scaling>
           <c:orientation val="minMax"/>
         </c:scaling>
@@ -555,7 +555,7 @@
         <c:majorTickMark val="out"/>
         <c:minorTickMark val="none"/>
         <c:tickLblPos val="nextTo"/>
-        <c:crossAx val="-2125553368"/>
+        <c:crossAx val="-2135739080"/>
         <c:crosses val="autoZero"/>
         <c:crossBetween val="midCat"/>
       </c:valAx>
@@ -939,11 +939,11 @@
           <c:showPercent val="0"/>
           <c:showBubbleSize val="0"/>
         </c:dLbls>
-        <c:axId val="-2122575704"/>
-        <c:axId val="-2122443896"/>
+        <c:axId val="-2130473496"/>
+        <c:axId val="-2128926888"/>
       </c:scatterChart>
       <c:valAx>
-        <c:axId val="-2122575704"/>
+        <c:axId val="-2130473496"/>
         <c:scaling>
           <c:orientation val="minMax"/>
           <c:max val="10.0"/>
@@ -974,12 +974,12 @@
         <c:majorTickMark val="out"/>
         <c:minorTickMark val="none"/>
         <c:tickLblPos val="nextTo"/>
-        <c:crossAx val="-2122443896"/>
+        <c:crossAx val="-2128926888"/>
         <c:crosses val="autoZero"/>
         <c:crossBetween val="midCat"/>
       </c:valAx>
       <c:valAx>
-        <c:axId val="-2122443896"/>
+        <c:axId val="-2128926888"/>
         <c:scaling>
           <c:orientation val="minMax"/>
         </c:scaling>
@@ -1008,7 +1008,7 @@
         <c:majorTickMark val="out"/>
         <c:minorTickMark val="none"/>
         <c:tickLblPos val="nextTo"/>
-        <c:crossAx val="-2122575704"/>
+        <c:crossAx val="-2130473496"/>
         <c:crosses val="autoZero"/>
         <c:crossBetween val="midCat"/>
       </c:valAx>
@@ -1216,7 +1216,7 @@
           <a:p>
             <a:fld id="{C8A432C8-69A7-458B-9684-2BFA64B31948}" type="datetime2">
               <a:rPr lang="en-US" smtClean="0"/>
-              <a:t>Wednesday, April 8, 15</a:t>
+              <a:t>Thursday, April 9, 15</a:t>
             </a:fld>
             <a:endParaRPr lang="en-US" dirty="0"/>
           </a:p>
@@ -1418,7 +1418,7 @@
           <a:p>
             <a:fld id="{8CC057FC-95B6-4D89-AFDA-ABA33EE921E5}" type="datetime2">
               <a:rPr lang="en-US" smtClean="0"/>
-              <a:t>Wednesday, April 8, 15</a:t>
+              <a:t>Thursday, April 9, 15</a:t>
             </a:fld>
             <a:endParaRPr lang="en-US" dirty="0"/>
           </a:p>
@@ -1595,7 +1595,7 @@
           <a:p>
             <a:fld id="{EC4549AC-EB31-477F-92A9-B1988E232878}" type="datetime2">
               <a:rPr lang="en-US" smtClean="0"/>
-              <a:t>Wednesday, April 8, 15</a:t>
+              <a:t>Thursday, April 9, 15</a:t>
             </a:fld>
             <a:endParaRPr lang="en-US" dirty="0"/>
           </a:p>
@@ -1762,7 +1762,7 @@
           <a:p>
             <a:fld id="{6396A3A3-94A6-4E5B-AF39-173ACA3E61CC}" type="datetime2">
               <a:rPr lang="en-US" smtClean="0"/>
-              <a:t>Wednesday, April 8, 15</a:t>
+              <a:t>Thursday, April 9, 15</a:t>
             </a:fld>
             <a:endParaRPr lang="en-US" dirty="0"/>
           </a:p>
@@ -2012,7 +2012,7 @@
           <a:p>
             <a:fld id="{9933D019-A32C-4EAD-B8E6-DBDA699692FD}" type="datetime2">
               <a:rPr lang="en-US" smtClean="0"/>
-              <a:t>Wednesday, April 8, 15</a:t>
+              <a:t>Thursday, April 9, 15</a:t>
             </a:fld>
             <a:endParaRPr lang="en-US" dirty="0"/>
           </a:p>
@@ -2332,7 +2332,7 @@
           <a:p>
             <a:fld id="{CCEBA98F-560C-4997-81C4-81D4D9187EAB}" type="datetime2">
               <a:rPr lang="en-US" smtClean="0"/>
-              <a:t>Wednesday, April 8, 15</a:t>
+              <a:t>Thursday, April 9, 15</a:t>
             </a:fld>
             <a:endParaRPr lang="en-US" dirty="0"/>
           </a:p>
@@ -2800,7 +2800,7 @@
           <a:p>
             <a:fld id="{150972B2-CA5C-437D-87D0-8081271A9E4B}" type="datetime2">
               <a:rPr lang="en-US" smtClean="0"/>
-              <a:t>Wednesday, April 8, 15</a:t>
+              <a:t>Thursday, April 9, 15</a:t>
             </a:fld>
             <a:endParaRPr lang="en-US" dirty="0"/>
           </a:p>
@@ -2950,7 +2950,7 @@
           <a:p>
             <a:fld id="{79CD4847-11EF-4466-A8AD-85CDB7B49118}" type="datetime2">
               <a:rPr lang="en-US" smtClean="0"/>
-              <a:t>Wednesday, April 8, 15</a:t>
+              <a:t>Thursday, April 9, 15</a:t>
             </a:fld>
             <a:endParaRPr lang="en-US" dirty="0"/>
           </a:p>
@@ -3042,7 +3042,7 @@
           <a:p>
             <a:fld id="{F168457A-3AB9-4880-8A0C-9F8524491207}" type="datetime2">
               <a:rPr lang="en-US" smtClean="0"/>
-              <a:t>Wednesday, April 8, 15</a:t>
+              <a:t>Thursday, April 9, 15</a:t>
             </a:fld>
             <a:endParaRPr lang="en-US" dirty="0"/>
           </a:p>
@@ -3318,7 +3318,7 @@
           <a:p>
             <a:fld id="{3FE976D3-5B7F-4300-ABED-C91F1B2AE209}" type="datetime2">
               <a:rPr lang="en-US" smtClean="0"/>
-              <a:t>Wednesday, April 8, 15</a:t>
+              <a:t>Thursday, April 9, 15</a:t>
             </a:fld>
             <a:endParaRPr lang="en-US" dirty="0"/>
           </a:p>
@@ -3625,7 +3625,7 @@
           <a:p>
             <a:fld id="{EBDC1E59-17DD-41CE-97CA-624A472382D4}" type="datetime2">
               <a:rPr lang="en-US" smtClean="0"/>
-              <a:t>Wednesday, April 8, 15</a:t>
+              <a:t>Thursday, April 9, 15</a:t>
             </a:fld>
             <a:endParaRPr lang="en-US" dirty="0"/>
           </a:p>
@@ -3925,7 +3925,7 @@
           <a:p>
             <a:fld id="{A80CB818-7379-467D-8E76-EF9D9074A26C}" type="datetime2">
               <a:rPr lang="en-US" smtClean="0"/>
-              <a:t>Wednesday, April 8, 15</a:t>
+              <a:t>Thursday, April 9, 15</a:t>
             </a:fld>
             <a:endParaRPr lang="en-US" dirty="0"/>
           </a:p>
@@ -4736,7 +4736,7 @@
             </a:pPr>
             <a:r>
               <a:rPr lang="en-US" sz="2400" dirty="0" smtClean="0"/>
-              <a:t>Curve Fitting from Server Side </a:t>
+              <a:t>Curve Fitting resources Server Side </a:t>
             </a:r>
           </a:p>
           <a:p>
@@ -6788,16 +6788,7 @@
                 </a:solidFill>
                 <a:latin typeface="Arial"/>
               </a:rPr>
-              <a:t>Testing Strategy – </a:t>
-            </a:r>
-            <a:r>
-              <a:rPr lang="en-US" sz="4000" dirty="0" smtClean="0">
-                <a:solidFill>
-                  <a:srgbClr val="D2533C"/>
-                </a:solidFill>
-                <a:latin typeface="Arial"/>
-              </a:rPr>
-              <a:t>Front End</a:t>
+              <a:t>Testing Strategy – Front End</a:t>
             </a:r>
             <a:endParaRPr dirty="0"/>
           </a:p>
@@ -8186,7 +8177,7 @@
           <a:graphicData uri="http://schemas.openxmlformats.org/presentationml/2006/ole">
             <mc:AlternateContent xmlns:mc="http://schemas.openxmlformats.org/markup-compatibility/2006">
               <mc:Choice xmlns:v="urn:schemas-microsoft-com:vml" Requires="v">
-                <p:oleObj spid="_x0000_s1045" name="Document" r:id="rId4" imgW="6819900" imgH="2514600" progId="Word.Document.12">
+                <p:oleObj spid="_x0000_s1049" name="Document" r:id="rId4" imgW="6819900" imgH="2514600" progId="Word.Document.12">
                   <p:embed/>
                 </p:oleObj>
               </mc:Choice>

</xml_diff>